<commit_message>
Bugfix: Title of "templates_stickers" slide wrongly deleted
</commit_message>
<xml_diff>
--- a/planner.pptx
+++ b/planner.pptx
@@ -11,7 +11,7 @@
     <p:handoutMasterId r:id="rId4"/>
   </p:handoutMasterIdLst>
   <p:sldIdLst>
-    <p:sldId id="258" r:id="rId2"/>
+    <p:sldId id="259" r:id="rId2"/>
   </p:sldIdLst>
   <p:sldSz cx="7559675" cy="10691813"/>
   <p:notesSz cx="6858000" cy="9144000"/>
@@ -215,7 +215,7 @@
           <a:p>
             <a:fld id="{E896AAC4-6753-43E0-9F41-7B05D5BA2E44}" type="datetimeFigureOut">
               <a:rPr lang="en-SG" smtClean="0"/>
-              <a:t>28/2/2021</a:t>
+              <a:t>2/3/2021</a:t>
             </a:fld>
             <a:endParaRPr lang="en-SG"/>
           </a:p>
@@ -392,7 +392,7 @@
           <a:p>
             <a:fld id="{78AA04CF-0708-4637-BD33-FFE500F694AC}" type="datetimeFigureOut">
               <a:rPr lang="en-SG" smtClean="0"/>
-              <a:t>28/2/2021</a:t>
+              <a:t>2/3/2021</a:t>
             </a:fld>
             <a:endParaRPr lang="en-SG"/>
           </a:p>
@@ -734,7 +734,7 @@
     </p:spTree>
     <p:extLst>
       <p:ext uri="{BB962C8B-B14F-4D97-AF65-F5344CB8AC3E}">
-        <p14:creationId xmlns:p14="http://schemas.microsoft.com/office/powerpoint/2010/main" val="2055257322"/>
+        <p14:creationId xmlns:p14="http://schemas.microsoft.com/office/powerpoint/2010/main" val="125344010"/>
       </p:ext>
     </p:extLst>
   </p:cSld>
@@ -33145,12 +33145,40 @@
           <a:chExt cx="0" cy="0"/>
         </a:xfrm>
       </p:grpSpPr>
+      <p:sp>
+        <p:nvSpPr>
+          <p:cNvPr id="2" name="templates_stickers">
+            <a:extLst>
+              <a:ext uri="{FF2B5EF4-FFF2-40B4-BE49-F238E27FC236}">
+                <a16:creationId xmlns:a16="http://schemas.microsoft.com/office/drawing/2014/main" id="{B35519C8-11CC-41FB-99FC-9E64ED067849}"/>
+              </a:ext>
+            </a:extLst>
+          </p:cNvPr>
+          <p:cNvSpPr>
+            <a:spLocks noGrp="1"/>
+          </p:cNvSpPr>
+          <p:nvPr>
+            <p:ph type="title"/>
+          </p:nvPr>
+        </p:nvSpPr>
+        <p:spPr/>
+        <p:txBody>
+          <a:bodyPr/>
+          <a:lstStyle/>
+          <a:p>
+            <a:r>
+              <a:rPr lang="en-SG" dirty="0"/>
+              <a:t>Stickers</a:t>
+            </a:r>
+          </a:p>
+        </p:txBody>
+      </p:sp>
       <p:graphicFrame>
         <p:nvGraphicFramePr>
-          <p:cNvPr id="4" name="calendar-month">
+          <p:cNvPr id="3" name="calendar-month">
             <a:extLst>
               <a:ext uri="{FF2B5EF4-FFF2-40B4-BE49-F238E27FC236}">
-                <a16:creationId xmlns:a16="http://schemas.microsoft.com/office/drawing/2014/main" id="{70E82E19-7B15-4F6E-BC38-EA9B688E015B}"/>
+                <a16:creationId xmlns:a16="http://schemas.microsoft.com/office/drawing/2014/main" id="{4A948532-5AFD-4D35-BA74-07327A92D244}"/>
               </a:ext>
             </a:extLst>
           </p:cNvPr>
@@ -33160,7 +33188,7 @@
           <p:nvPr>
             <p:extLst>
               <p:ext uri="{D42A27DB-BD31-4B8C-83A1-F6EECF244321}">
-                <p14:modId xmlns:p14="http://schemas.microsoft.com/office/powerpoint/2010/main" val="2682591105"/>
+                <p14:modId xmlns:p14="http://schemas.microsoft.com/office/powerpoint/2010/main" val="3754917544"/>
               </p:ext>
             </p:extLst>
           </p:nvPr>
@@ -33890,10 +33918,10 @@
       </p:graphicFrame>
       <p:graphicFrame>
         <p:nvGraphicFramePr>
-          <p:cNvPr id="5" name="calendar-week">
+          <p:cNvPr id="4" name="calendar-week">
             <a:extLst>
               <a:ext uri="{FF2B5EF4-FFF2-40B4-BE49-F238E27FC236}">
-                <a16:creationId xmlns:a16="http://schemas.microsoft.com/office/drawing/2014/main" id="{4428BD44-91A5-4FE6-8F0A-FF5B3E3A4FB4}"/>
+                <a16:creationId xmlns:a16="http://schemas.microsoft.com/office/drawing/2014/main" id="{36B24601-B422-4B6F-9ACB-25A953BB0607}"/>
               </a:ext>
             </a:extLst>
           </p:cNvPr>
@@ -33903,7 +33931,7 @@
           <p:nvPr>
             <p:extLst>
               <p:ext uri="{D42A27DB-BD31-4B8C-83A1-F6EECF244321}">
-                <p14:modId xmlns:p14="http://schemas.microsoft.com/office/powerpoint/2010/main" val="2347873630"/>
+                <p14:modId xmlns:p14="http://schemas.microsoft.com/office/powerpoint/2010/main" val="3117141189"/>
               </p:ext>
             </p:extLst>
           </p:nvPr>
@@ -34633,10 +34661,10 @@
       </p:graphicFrame>
       <p:graphicFrame>
         <p:nvGraphicFramePr>
-          <p:cNvPr id="6" name="habit-week">
+          <p:cNvPr id="5" name="habit-week">
             <a:extLst>
               <a:ext uri="{FF2B5EF4-FFF2-40B4-BE49-F238E27FC236}">
-                <a16:creationId xmlns:a16="http://schemas.microsoft.com/office/drawing/2014/main" id="{5D21307E-E9EC-4299-8909-32DB18FB081C}"/>
+                <a16:creationId xmlns:a16="http://schemas.microsoft.com/office/drawing/2014/main" id="{641B9209-5BBD-486C-9074-BD32614E4184}"/>
               </a:ext>
             </a:extLst>
           </p:cNvPr>
@@ -34646,7 +34674,7 @@
           <p:nvPr>
             <p:extLst>
               <p:ext uri="{D42A27DB-BD31-4B8C-83A1-F6EECF244321}">
-                <p14:modId xmlns:p14="http://schemas.microsoft.com/office/powerpoint/2010/main" val="2520219110"/>
+                <p14:modId xmlns:p14="http://schemas.microsoft.com/office/powerpoint/2010/main" val="2843629781"/>
               </p:ext>
             </p:extLst>
           </p:nvPr>
@@ -36863,10 +36891,10 @@
       </p:graphicFrame>
       <p:sp>
         <p:nvSpPr>
-          <p:cNvPr id="8" name="slide-num">
+          <p:cNvPr id="6" name="slide-num">
             <a:extLst>
               <a:ext uri="{FF2B5EF4-FFF2-40B4-BE49-F238E27FC236}">
-                <a16:creationId xmlns:a16="http://schemas.microsoft.com/office/drawing/2014/main" id="{E90D244F-A5B8-4E28-A424-419A39AE366E}"/>
+                <a16:creationId xmlns:a16="http://schemas.microsoft.com/office/drawing/2014/main" id="{E9E359AF-F5E6-416E-B380-0A068DE2FCD1}"/>
               </a:ext>
             </a:extLst>
           </p:cNvPr>
@@ -36997,7 +37025,7 @@
           <p:cNvPr id="7" name="calendar-year">
             <a:extLst>
               <a:ext uri="{FF2B5EF4-FFF2-40B4-BE49-F238E27FC236}">
-                <a16:creationId xmlns:a16="http://schemas.microsoft.com/office/drawing/2014/main" id="{701D4787-965A-40A6-B69D-FA80CF720DF9}"/>
+                <a16:creationId xmlns:a16="http://schemas.microsoft.com/office/drawing/2014/main" id="{09F06521-8B0F-4491-928E-CC0546C8B4EA}"/>
               </a:ext>
             </a:extLst>
           </p:cNvPr>
@@ -37007,7 +37035,7 @@
           <p:nvPr>
             <p:extLst>
               <p:ext uri="{D42A27DB-BD31-4B8C-83A1-F6EECF244321}">
-                <p14:modId xmlns:p14="http://schemas.microsoft.com/office/powerpoint/2010/main" val="1716147266"/>
+                <p14:modId xmlns:p14="http://schemas.microsoft.com/office/powerpoint/2010/main" val="1895786588"/>
               </p:ext>
             </p:extLst>
           </p:nvPr>
@@ -37735,38 +37763,10 @@
           </a:graphicData>
         </a:graphic>
       </p:graphicFrame>
-      <p:sp>
-        <p:nvSpPr>
-          <p:cNvPr id="2" name="templates_stickers">
-            <a:extLst>
-              <a:ext uri="{FF2B5EF4-FFF2-40B4-BE49-F238E27FC236}">
-                <a16:creationId xmlns:a16="http://schemas.microsoft.com/office/drawing/2014/main" id="{B35519C8-11CC-41FB-99FC-9E64ED067849}"/>
-              </a:ext>
-            </a:extLst>
-          </p:cNvPr>
-          <p:cNvSpPr>
-            <a:spLocks noGrp="1"/>
-          </p:cNvSpPr>
-          <p:nvPr>
-            <p:ph type="title"/>
-          </p:nvPr>
-        </p:nvSpPr>
-        <p:spPr/>
-        <p:txBody>
-          <a:bodyPr/>
-          <a:lstStyle/>
-          <a:p>
-            <a:r>
-              <a:rPr lang="en-SG" dirty="0"/>
-              <a:t>Stickers</a:t>
-            </a:r>
-          </a:p>
-        </p:txBody>
-      </p:sp>
     </p:spTree>
     <p:extLst>
       <p:ext uri="{BB962C8B-B14F-4D97-AF65-F5344CB8AC3E}">
-        <p14:creationId xmlns:p14="http://schemas.microsoft.com/office/powerpoint/2010/main" val="3371235230"/>
+        <p14:creationId xmlns:p14="http://schemas.microsoft.com/office/powerpoint/2010/main" val="4052587195"/>
       </p:ext>
     </p:extLst>
   </p:cSld>

</xml_diff>

<commit_message>
Update with extra stickers
</commit_message>
<xml_diff>
--- a/planner.pptx
+++ b/planner.pptx
@@ -27287,9 +27287,14 @@
 <p:sldMaster xmlns:a="http://schemas.openxmlformats.org/drawingml/2006/main" xmlns:r="http://schemas.openxmlformats.org/officeDocument/2006/relationships" xmlns:p="http://schemas.openxmlformats.org/presentationml/2006/main">
   <p:cSld>
     <p:bg>
-      <p:bgRef idx="1001">
-        <a:schemeClr val="bg1"/>
-      </p:bgRef>
+      <p:bgPr>
+        <a:solidFill>
+          <a:schemeClr val="bg1">
+            <a:alpha val="0"/>
+          </a:schemeClr>
+        </a:solidFill>
+        <a:effectLst/>
+      </p:bgPr>
     </p:bg>
     <p:spTree>
       <p:nvGrpSpPr>
@@ -27439,38 +27444,37 @@
           <a:p>
             <a:pPr lvl="0"/>
             <a:r>
-              <a:rPr lang="en-US"/>
+              <a:rPr lang="en-US" dirty="0"/>
               <a:t>Click to edit Master text styles</a:t>
             </a:r>
           </a:p>
           <a:p>
             <a:pPr lvl="1"/>
             <a:r>
-              <a:rPr lang="en-US"/>
+              <a:rPr lang="en-US" dirty="0"/>
               <a:t>Second level</a:t>
             </a:r>
           </a:p>
           <a:p>
             <a:pPr lvl="2"/>
             <a:r>
-              <a:rPr lang="en-US"/>
+              <a:rPr lang="en-US" dirty="0"/>
               <a:t>Third level</a:t>
             </a:r>
           </a:p>
           <a:p>
             <a:pPr lvl="3"/>
             <a:r>
-              <a:rPr lang="en-US"/>
+              <a:rPr lang="en-US" dirty="0"/>
               <a:t>Fourth level</a:t>
             </a:r>
           </a:p>
           <a:p>
             <a:pPr lvl="4"/>
             <a:r>
-              <a:rPr lang="en-US"/>
+              <a:rPr lang="en-US" dirty="0"/>
               <a:t>Fifth level</a:t>
             </a:r>
-            <a:endParaRPr lang="en-US" dirty="0"/>
           </a:p>
         </p:txBody>
       </p:sp>

</xml_diff>